<commit_message>
final version of phase 1 slides
</commit_message>
<xml_diff>
--- a/Slides/Phase1.pptx
+++ b/Slides/Phase1.pptx
@@ -1,6 +1,6 @@
 
 <file path=ppt/presentation.xml><?xml version="1.0" encoding="utf-8"?>
-<p:presentation xmlns:a="http://schemas.openxmlformats.org/drawingml/2006/main" xmlns:r="http://schemas.openxmlformats.org/officeDocument/2006/relationships" xmlns:p="http://schemas.openxmlformats.org/presentationml/2006/main" saveSubsetFonts="1">
+<p:presentation xmlns:a="http://schemas.openxmlformats.org/drawingml/2006/main" xmlns:r="http://schemas.openxmlformats.org/officeDocument/2006/relationships" xmlns:p="http://schemas.openxmlformats.org/presentationml/2006/main" embedTrueTypeFonts="1" saveSubsetFonts="1">
   <p:sldMasterIdLst>
     <p:sldMasterId id="2147483648" r:id="rId2"/>
   </p:sldMasterIdLst>
@@ -32,6 +32,32 @@
   </p:sldIdLst>
   <p:sldSz cx="9144000" cy="6858000" type="screen4x3"/>
   <p:notesSz cx="6858000" cy="9144000"/>
+  <p:embeddedFontLst>
+    <p:embeddedFont>
+      <p:font typeface="B Davat" panose="00000400000000000000" pitchFamily="2" charset="-78"/>
+      <p:regular r:id="rId25"/>
+    </p:embeddedFont>
+    <p:embeddedFont>
+      <p:font typeface="B Nazanin" panose="00000400000000000000" pitchFamily="2" charset="-78"/>
+      <p:regular r:id="rId26"/>
+      <p:bold r:id="rId27"/>
+    </p:embeddedFont>
+    <p:embeddedFont>
+      <p:font typeface="Calibri" panose="020F0502020204030204" pitchFamily="34" charset="0"/>
+      <p:regular r:id="rId28"/>
+      <p:bold r:id="rId29"/>
+      <p:italic r:id="rId30"/>
+      <p:boldItalic r:id="rId31"/>
+    </p:embeddedFont>
+    <p:embeddedFont>
+      <p:font typeface="B Titr" panose="00000700000000000000" pitchFamily="2" charset="-78"/>
+      <p:bold r:id="rId32"/>
+    </p:embeddedFont>
+    <p:embeddedFont>
+      <p:font typeface="Palace Script MT" panose="030303020206070C0B05" pitchFamily="66" charset="0"/>
+      <p:italic r:id="rId33"/>
+    </p:embeddedFont>
+  </p:embeddedFontLst>
   <p:defaultTextStyle>
     <a:defPPr>
       <a:defRPr lang="fr-FR"/>
@@ -28854,7 +28880,7 @@
             <a:fld id="{1ADB9F1D-B996-4BA0-9039-613E6AF2E072}" type="datetimeFigureOut">
               <a:rPr lang="fr-FR" smtClean="0"/>
               <a:pPr/>
-              <a:t>20/10/2013</a:t>
+              <a:t>21/10/2013</a:t>
             </a:fld>
             <a:endParaRPr lang="fr-CA"/>
           </a:p>
@@ -29316,7 +29342,7 @@
               <a:pPr>
                 <a:defRPr/>
               </a:pPr>
-              <a:t>20/10/2013</a:t>
+              <a:t>21/10/2013</a:t>
             </a:fld>
             <a:endParaRPr lang="fr-CA"/>
           </a:p>
@@ -29508,7 +29534,7 @@
               <a:pPr>
                 <a:defRPr/>
               </a:pPr>
-              <a:t>20/10/2013</a:t>
+              <a:t>21/10/2013</a:t>
             </a:fld>
             <a:endParaRPr lang="fr-CA"/>
           </a:p>
@@ -29710,7 +29736,7 @@
               <a:pPr>
                 <a:defRPr/>
               </a:pPr>
-              <a:t>20/10/2013</a:t>
+              <a:t>21/10/2013</a:t>
             </a:fld>
             <a:endParaRPr lang="fr-CA"/>
           </a:p>
@@ -29902,7 +29928,7 @@
               <a:pPr>
                 <a:defRPr/>
               </a:pPr>
-              <a:t>20/10/2013</a:t>
+              <a:t>21/10/2013</a:t>
             </a:fld>
             <a:endParaRPr lang="fr-CA"/>
           </a:p>
@@ -30170,7 +30196,7 @@
               <a:pPr>
                 <a:defRPr/>
               </a:pPr>
-              <a:t>20/10/2013</a:t>
+              <a:t>21/10/2013</a:t>
             </a:fld>
             <a:endParaRPr lang="fr-CA"/>
           </a:p>
@@ -30480,7 +30506,7 @@
               <a:pPr>
                 <a:defRPr/>
               </a:pPr>
-              <a:t>20/10/2013</a:t>
+              <a:t>21/10/2013</a:t>
             </a:fld>
             <a:endParaRPr lang="fr-CA"/>
           </a:p>
@@ -30924,7 +30950,7 @@
               <a:pPr>
                 <a:defRPr/>
               </a:pPr>
-              <a:t>20/10/2013</a:t>
+              <a:t>21/10/2013</a:t>
             </a:fld>
             <a:endParaRPr lang="fr-CA"/>
           </a:p>
@@ -31064,7 +31090,7 @@
               <a:pPr>
                 <a:defRPr/>
               </a:pPr>
-              <a:t>20/10/2013</a:t>
+              <a:t>21/10/2013</a:t>
             </a:fld>
             <a:endParaRPr lang="fr-CA"/>
           </a:p>
@@ -31181,7 +31207,7 @@
               <a:pPr>
                 <a:defRPr/>
               </a:pPr>
-              <a:t>20/10/2013</a:t>
+              <a:t>21/10/2013</a:t>
             </a:fld>
             <a:endParaRPr lang="fr-CA"/>
           </a:p>
@@ -31480,7 +31506,7 @@
               <a:pPr>
                 <a:defRPr/>
               </a:pPr>
-              <a:t>20/10/2013</a:t>
+              <a:t>21/10/2013</a:t>
             </a:fld>
             <a:endParaRPr lang="fr-CA"/>
           </a:p>
@@ -31762,7 +31788,7 @@
               <a:pPr>
                 <a:defRPr/>
               </a:pPr>
-              <a:t>20/10/2013</a:t>
+              <a:t>21/10/2013</a:t>
             </a:fld>
             <a:endParaRPr lang="fr-CA"/>
           </a:p>
@@ -32019,7 +32045,7 @@
               <a:pPr>
                 <a:defRPr/>
               </a:pPr>
-              <a:t>20/10/2013</a:t>
+              <a:t>21/10/2013</a:t>
             </a:fld>
             <a:endParaRPr lang="fr-CA"/>
           </a:p>
@@ -32781,7 +32807,17 @@
                 <a:latin typeface="Times New Roman" panose="02020503050405090304" pitchFamily="18" charset="0"/>
                 <a:cs typeface="B Titr" panose="00000700000000000000" pitchFamily="2" charset="-78"/>
               </a:rPr>
-              <a:t>نیازمندی‌های دیگر</a:t>
+              <a:t>نیازمندی‌های </a:t>
+            </a:r>
+            <a:r>
+              <a:rPr lang="fa-IR" sz="4000" dirty="0" smtClean="0">
+                <a:solidFill>
+                  <a:srgbClr val="FF0000"/>
+                </a:solidFill>
+                <a:latin typeface="Times New Roman" panose="02020503050405090304" pitchFamily="18" charset="0"/>
+                <a:cs typeface="B Titr" panose="00000700000000000000" pitchFamily="2" charset="-78"/>
+              </a:rPr>
+              <a:t>کلی</a:t>
             </a:r>
             <a:endParaRPr lang="en-US" sz="4000" dirty="0">
               <a:solidFill>
@@ -32819,8 +32855,19 @@
                 <a:latin typeface="Times New Roman" panose="02020503050405090304" pitchFamily="18" charset="0"/>
                 <a:cs typeface="B Nazanin" panose="00000400000000000000" pitchFamily="2" charset="-78"/>
               </a:rPr>
-              <a:t>ارسال پست</a:t>
+              <a:t>ارسال </a:t>
             </a:r>
+            <a:r>
+              <a:rPr lang="fa-IR" dirty="0" smtClean="0">
+                <a:latin typeface="Times New Roman" panose="02020503050405090304" pitchFamily="18" charset="0"/>
+                <a:cs typeface="B Nazanin" panose="00000400000000000000" pitchFamily="2" charset="-78"/>
+              </a:rPr>
+              <a:t>پست</a:t>
+            </a:r>
+            <a:endParaRPr lang="fa-IR" dirty="0" smtClean="0">
+              <a:latin typeface="Times New Roman" panose="02020503050405090304" pitchFamily="18" charset="0"/>
+              <a:cs typeface="B Nazanin" panose="00000400000000000000" pitchFamily="2" charset="-78"/>
+            </a:endParaRPr>
           </a:p>
           <a:p>
             <a:pPr algn="r" rtl="1"/>
@@ -32849,8 +32896,19 @@
                 <a:latin typeface="Times New Roman" panose="02020503050405090304" pitchFamily="18" charset="0"/>
                 <a:cs typeface="B Nazanin" panose="00000400000000000000" pitchFamily="2" charset="-78"/>
               </a:rPr>
-              <a:t>امتیاز دادن به پروژه توسط دیگران</a:t>
+              <a:t>امتیاز دادن به </a:t>
             </a:r>
+            <a:r>
+              <a:rPr lang="fa-IR" dirty="0" smtClean="0">
+                <a:latin typeface="Times New Roman" panose="02020503050405090304" pitchFamily="18" charset="0"/>
+                <a:cs typeface="B Nazanin" panose="00000400000000000000" pitchFamily="2" charset="-78"/>
+              </a:rPr>
+              <a:t>پروژه‌ها</a:t>
+            </a:r>
+            <a:endParaRPr lang="fa-IR" dirty="0" smtClean="0">
+              <a:latin typeface="Times New Roman" panose="02020503050405090304" pitchFamily="18" charset="0"/>
+              <a:cs typeface="B Nazanin" panose="00000400000000000000" pitchFamily="2" charset="-78"/>
+            </a:endParaRPr>
           </a:p>
           <a:p>
             <a:pPr algn="r" rtl="1"/>
@@ -33285,7 +33343,14 @@
                 <a:latin typeface="Times New Roman" panose="02020503050405090304" pitchFamily="18" charset="0"/>
                 <a:cs typeface="B Nazanin" panose="00000400000000000000" pitchFamily="2" charset="-78"/>
               </a:rPr>
-              <a:t>نیازمندی‌های فاز اول با تحلیل سیستم به دست آمدند</a:t>
+              <a:t>نیازمندی </a:t>
+            </a:r>
+            <a:r>
+              <a:rPr lang="fa-IR" dirty="0" smtClean="0">
+                <a:latin typeface="Times New Roman" panose="02020503050405090304" pitchFamily="18" charset="0"/>
+                <a:cs typeface="B Nazanin" panose="00000400000000000000" pitchFamily="2" charset="-78"/>
+              </a:rPr>
+              <a:t>ثبت‌نام و ورود به سایت برای استفاده از امکانات آن</a:t>
             </a:r>
           </a:p>
           <a:p>
@@ -33295,7 +33360,28 @@
                 <a:latin typeface="Times New Roman" panose="02020503050405090304" pitchFamily="18" charset="0"/>
                 <a:cs typeface="B Nazanin" panose="00000400000000000000" pitchFamily="2" charset="-78"/>
               </a:rPr>
-              <a:t>نیازمندی ثبت‌نام و ورود به سایت برای استفاده از امکانات آن</a:t>
+              <a:t>صفحه خانگی سایت باید این </a:t>
+            </a:r>
+            <a:r>
+              <a:rPr lang="fa-IR" dirty="0" smtClean="0">
+                <a:latin typeface="Times New Roman" panose="02020503050405090304" pitchFamily="18" charset="0"/>
+                <a:cs typeface="B Nazanin" panose="00000400000000000000" pitchFamily="2" charset="-78"/>
+              </a:rPr>
+              <a:t>قابلیت‌ها </a:t>
+            </a:r>
+            <a:r>
+              <a:rPr lang="fa-IR" dirty="0" smtClean="0">
+                <a:latin typeface="Times New Roman" panose="02020503050405090304" pitchFamily="18" charset="0"/>
+                <a:cs typeface="B Nazanin" panose="00000400000000000000" pitchFamily="2" charset="-78"/>
+              </a:rPr>
+              <a:t>را در اختیار قرار </a:t>
+            </a:r>
+            <a:r>
+              <a:rPr lang="fa-IR" dirty="0" smtClean="0">
+                <a:latin typeface="Times New Roman" panose="02020503050405090304" pitchFamily="18" charset="0"/>
+                <a:cs typeface="B Nazanin" panose="00000400000000000000" pitchFamily="2" charset="-78"/>
+              </a:rPr>
+              <a:t>دهد</a:t>
             </a:r>
           </a:p>
           <a:p>
@@ -33305,69 +33391,68 @@
                 <a:latin typeface="Times New Roman" panose="02020503050405090304" pitchFamily="18" charset="0"/>
                 <a:cs typeface="B Nazanin" panose="00000400000000000000" pitchFamily="2" charset="-78"/>
               </a:rPr>
-              <a:t>صفحه خانگی سایت باید این قابلیت را در اختیار قرار دهد</a:t>
+              <a:t>اطلاعات</a:t>
             </a:r>
-            <a:endParaRPr lang="en-US" dirty="0">
-              <a:latin typeface="Times New Roman" panose="02020503050405090304" pitchFamily="18" charset="0"/>
-              <a:cs typeface="B Nazanin" panose="00000400000000000000" pitchFamily="2" charset="-78"/>
-            </a:endParaRPr>
+            <a:r>
+              <a:rPr lang="fa-IR" dirty="0" smtClean="0">
+                <a:latin typeface="Times New Roman" panose="02020503050405090304" pitchFamily="18" charset="0"/>
+                <a:cs typeface="B Nazanin" panose="00000400000000000000" pitchFamily="2" charset="-78"/>
+              </a:rPr>
+              <a:t> مورد نیاز برای ثبت‌نام در سایت با توجه به اطلاعات مورد نیاز ما برای استفاده افراد از سیستم شناسایی شدند</a:t>
+            </a:r>
+          </a:p>
+          <a:p>
+            <a:pPr algn="r" rtl="1"/>
+            <a:r>
+              <a:rPr lang="fa-IR" dirty="0" smtClean="0">
+                <a:latin typeface="Times New Roman" panose="02020503050405090304" pitchFamily="18" charset="0"/>
+                <a:cs typeface="B Nazanin" panose="00000400000000000000" pitchFamily="2" charset="-78"/>
+              </a:rPr>
+              <a:t>نام، نام خانوادگی، ایمیل، جنسیت، رمز عبور، تکرار رمز عبور</a:t>
+            </a:r>
+          </a:p>
+          <a:p>
+            <a:pPr algn="r" rtl="1"/>
+            <a:r>
+              <a:rPr lang="fa-IR" dirty="0" smtClean="0">
+                <a:latin typeface="Times New Roman" panose="02020503050405090304" pitchFamily="18" charset="0"/>
+                <a:cs typeface="B Nazanin" panose="00000400000000000000" pitchFamily="2" charset="-78"/>
+              </a:rPr>
+              <a:t>نحوه ورود به سایت با آدرس ایمیل و پسورد باشد</a:t>
+            </a:r>
+          </a:p>
+          <a:p>
+            <a:pPr algn="r" rtl="1"/>
+            <a:r>
+              <a:rPr lang="fa-IR" dirty="0" smtClean="0">
+                <a:latin typeface="Times New Roman" panose="02020503050405090304" pitchFamily="18" charset="0"/>
+                <a:cs typeface="B Nazanin" panose="00000400000000000000" pitchFamily="2" charset="-78"/>
+              </a:rPr>
+              <a:t>جستجوی افراد بر اساس نام و نام خانوادگی صورت بگیرد</a:t>
+            </a:r>
+          </a:p>
+          <a:p>
+            <a:pPr algn="r" rtl="1"/>
+            <a:r>
+              <a:rPr lang="fa-IR" dirty="0" smtClean="0">
+                <a:latin typeface="Times New Roman" panose="02020503050405090304" pitchFamily="18" charset="0"/>
+                <a:cs typeface="B Nazanin" panose="00000400000000000000" pitchFamily="2" charset="-78"/>
+              </a:rPr>
+              <a:t>ویرایش اطلاعات شخصی مورد نیاز است</a:t>
+            </a:r>
+          </a:p>
+          <a:p>
+            <a:pPr algn="r" rtl="1"/>
+            <a:r>
+              <a:rPr lang="fa-IR" dirty="0" smtClean="0">
+                <a:latin typeface="Times New Roman" panose="02020503050405090304" pitchFamily="18" charset="0"/>
+                <a:cs typeface="B Nazanin" panose="00000400000000000000" pitchFamily="2" charset="-78"/>
+              </a:rPr>
+              <a:t>عکسی پیشفرض برای افراد انتخاب می‌شود</a:t>
+            </a:r>
           </a:p>
         </p:txBody>
       </p:sp>
-      <p:pic>
-        <p:nvPicPr>
-          <p:cNvPr id="2050" name="Picture 2"/>
-          <p:cNvPicPr>
-            <a:picLocks noChangeAspect="1" noChangeArrowheads="1"/>
-          </p:cNvPicPr>
-          <p:nvPr/>
-        </p:nvPicPr>
-        <p:blipFill>
-          <a:blip r:embed="rId3">
-            <a:extLst>
-              <a:ext uri="{28A0092B-C50C-407E-A947-70E740481C1C}">
-                <a14:useLocalDpi xmlns:a14="http://schemas.microsoft.com/office/drawing/2010/main" val="0"/>
-              </a:ext>
-            </a:extLst>
-          </a:blip>
-          <a:srcRect/>
-          <a:stretch>
-            <a:fillRect/>
-          </a:stretch>
-        </p:blipFill>
-        <p:spPr bwMode="auto">
-          <a:xfrm>
-            <a:off x="619125" y="3295650"/>
-            <a:ext cx="7905750" cy="876300"/>
-          </a:xfrm>
-          <a:prstGeom prst="rect">
-            <a:avLst/>
-          </a:prstGeom>
-          <a:noFill/>
-          <a:ln>
-            <a:noFill/>
-          </a:ln>
-          <a:extLst>
-            <a:ext uri="{909E8E84-426E-40DD-AFC4-6F175D3DCCD1}">
-              <a14:hiddenFill xmlns:a14="http://schemas.microsoft.com/office/drawing/2010/main">
-                <a:solidFill>
-                  <a:schemeClr val="accent1"/>
-                </a:solidFill>
-              </a14:hiddenFill>
-            </a:ext>
-            <a:ext uri="{91240B29-F687-4F45-9708-019B960494DF}">
-              <a14:hiddenLine xmlns:a14="http://schemas.microsoft.com/office/drawing/2010/main" w="9525">
-                <a:solidFill>
-                  <a:schemeClr val="tx1"/>
-                </a:solidFill>
-                <a:miter lim="800000"/>
-                <a:headEnd/>
-                <a:tailEnd/>
-              </a14:hiddenLine>
-            </a:ext>
-          </a:extLst>
-        </p:spPr>
-      </p:pic>
     </p:spTree>
     <p:extLst>
       <p:ext uri="{BB962C8B-B14F-4D97-AF65-F5344CB8AC3E}">
@@ -33486,7 +33571,56 @@
                 <a:latin typeface="Times New Roman" panose="02020503050405090304" pitchFamily="18" charset="0"/>
                 <a:cs typeface="B Nazanin" panose="00000400000000000000" pitchFamily="2" charset="-78"/>
               </a:rPr>
-              <a:t>ظاهر صفحه خانگی</a:t>
+              <a:t>طراحی ظاهر </a:t>
+            </a:r>
+            <a:r>
+              <a:rPr lang="fa-IR" dirty="0" smtClean="0">
+                <a:latin typeface="Times New Roman" panose="02020503050405090304" pitchFamily="18" charset="0"/>
+                <a:cs typeface="B Nazanin" panose="00000400000000000000" pitchFamily="2" charset="-78"/>
+              </a:rPr>
+              <a:t>صفحه </a:t>
+            </a:r>
+            <a:r>
+              <a:rPr lang="fa-IR" dirty="0" smtClean="0">
+                <a:latin typeface="Times New Roman" panose="02020503050405090304" pitchFamily="18" charset="0"/>
+                <a:cs typeface="B Nazanin" panose="00000400000000000000" pitchFamily="2" charset="-78"/>
+              </a:rPr>
+              <a:t>خانگی سایت و صفحه نمایه</a:t>
+            </a:r>
+            <a:endParaRPr lang="fa-IR" dirty="0" smtClean="0">
+              <a:latin typeface="Times New Roman" panose="02020503050405090304" pitchFamily="18" charset="0"/>
+              <a:cs typeface="B Nazanin" panose="00000400000000000000" pitchFamily="2" charset="-78"/>
+            </a:endParaRPr>
+          </a:p>
+          <a:p>
+            <a:pPr algn="r" rtl="1"/>
+            <a:r>
+              <a:rPr lang="fa-IR" dirty="0" smtClean="0">
+                <a:latin typeface="Times New Roman" panose="02020503050405090304" pitchFamily="18" charset="0"/>
+                <a:cs typeface="B Nazanin" panose="00000400000000000000" pitchFamily="2" charset="-78"/>
+              </a:rPr>
+              <a:t>نحوه ثبت نام، اطلاعات </a:t>
+            </a:r>
+            <a:r>
+              <a:rPr lang="fa-IR" dirty="0" smtClean="0">
+                <a:latin typeface="Times New Roman" panose="02020503050405090304" pitchFamily="18" charset="0"/>
+                <a:cs typeface="B Nazanin" panose="00000400000000000000" pitchFamily="2" charset="-78"/>
+              </a:rPr>
+              <a:t>که باید دریافت شده و در پایگاه داده ذخیره شوند</a:t>
+            </a:r>
+            <a:endParaRPr lang="fa-IR" dirty="0">
+              <a:latin typeface="Times New Roman" panose="02020503050405090304" pitchFamily="18" charset="0"/>
+              <a:cs typeface="B Nazanin" panose="00000400000000000000" pitchFamily="2" charset="-78"/>
+            </a:endParaRPr>
+          </a:p>
+          <a:p>
+            <a:pPr algn="r" rtl="1"/>
+            <a:r>
+              <a:rPr lang="fa-IR" dirty="0" smtClean="0">
+                <a:latin typeface="Times New Roman" panose="02020503050405090304" pitchFamily="18" charset="0"/>
+                <a:cs typeface="B Nazanin" panose="00000400000000000000" pitchFamily="2" charset="-78"/>
+              </a:rPr>
+              <a:t>چک کردن و صحیح بودن اطلاعات وارد شده در زمان ثبت </a:t>
             </a:r>
           </a:p>
           <a:p>
@@ -33496,15 +33630,42 @@
                 <a:latin typeface="Times New Roman" panose="02020503050405090304" pitchFamily="18" charset="0"/>
                 <a:cs typeface="B Nazanin" panose="00000400000000000000" pitchFamily="2" charset="-78"/>
               </a:rPr>
-              <a:t>نحوه ثبت نام، اطلاعات لازم و مراحل آن</a:t>
+              <a:t>معتبر بودن اطلاعات وارد شده برای ورود به سایت</a:t>
             </a:r>
           </a:p>
           <a:p>
             <a:pPr algn="r" rtl="1"/>
-            <a:endParaRPr lang="en-US" dirty="0">
-              <a:latin typeface="Times New Roman" panose="02020503050405090304" pitchFamily="18" charset="0"/>
-              <a:cs typeface="B Nazanin" panose="00000400000000000000" pitchFamily="2" charset="-78"/>
-            </a:endParaRPr>
+            <a:r>
+              <a:rPr lang="fa-IR" dirty="0" smtClean="0">
+                <a:latin typeface="Times New Roman" panose="02020503050405090304" pitchFamily="18" charset="0"/>
+                <a:cs typeface="B Nazanin" panose="00000400000000000000" pitchFamily="2" charset="-78"/>
+              </a:rPr>
+              <a:t>تولید عکس پیشفرض</a:t>
+            </a:r>
+            <a:r>
+              <a:rPr lang="fa-IR" dirty="0">
+                <a:latin typeface="Times New Roman" panose="02020503050405090304" pitchFamily="18" charset="0"/>
+                <a:cs typeface="B Nazanin" panose="00000400000000000000" pitchFamily="2" charset="-78"/>
+              </a:rPr>
+              <a:t> </a:t>
+            </a:r>
+            <a:r>
+              <a:rPr lang="fa-IR" dirty="0" smtClean="0">
+                <a:latin typeface="Times New Roman" panose="02020503050405090304" pitchFamily="18" charset="0"/>
+                <a:cs typeface="B Nazanin" panose="00000400000000000000" pitchFamily="2" charset="-78"/>
+              </a:rPr>
+              <a:t>نمایه</a:t>
+            </a:r>
+          </a:p>
+          <a:p>
+            <a:pPr algn="r" rtl="1"/>
+            <a:r>
+              <a:rPr lang="fa-IR" dirty="0" smtClean="0">
+                <a:latin typeface="Times New Roman" panose="02020503050405090304" pitchFamily="18" charset="0"/>
+                <a:cs typeface="B Nazanin" panose="00000400000000000000" pitchFamily="2" charset="-78"/>
+              </a:rPr>
+              <a:t>بخشی از اطلاعات کاربری نمایش داده شوند</a:t>
+            </a:r>
           </a:p>
         </p:txBody>
       </p:sp>
@@ -33621,10 +33782,123 @@
           <a:lstStyle/>
           <a:p>
             <a:pPr algn="r" rtl="1"/>
-            <a:endParaRPr lang="en-US" dirty="0">
+            <a:r>
+              <a:rPr lang="fa-IR" sz="2900" dirty="0">
+                <a:latin typeface="Times New Roman" panose="02020503050405090304" pitchFamily="18" charset="0"/>
+                <a:cs typeface="B Nazanin" panose="00000400000000000000" pitchFamily="2" charset="-78"/>
+              </a:rPr>
+              <a:t>چک کردن </a:t>
+            </a:r>
+            <a:r>
+              <a:rPr lang="fa-IR" sz="2900" dirty="0" smtClean="0">
+                <a:latin typeface="Times New Roman" panose="02020503050405090304" pitchFamily="18" charset="0"/>
+                <a:cs typeface="B Nazanin" panose="00000400000000000000" pitchFamily="2" charset="-78"/>
+              </a:rPr>
+              <a:t>معتبر بودن رمز </a:t>
+            </a:r>
+            <a:r>
+              <a:rPr lang="fa-IR" sz="2900" dirty="0">
+                <a:latin typeface="Times New Roman" panose="02020503050405090304" pitchFamily="18" charset="0"/>
+                <a:cs typeface="B Nazanin" panose="00000400000000000000" pitchFamily="2" charset="-78"/>
+              </a:rPr>
+              <a:t>عبور با استفاده از تابع هش </a:t>
+            </a:r>
+            <a:r>
+              <a:rPr lang="en-US" sz="2900" dirty="0">
+                <a:latin typeface="Times New Roman" panose="02020503050405090304" pitchFamily="18" charset="0"/>
+                <a:cs typeface="B Nazanin" panose="00000400000000000000" pitchFamily="2" charset="-78"/>
+              </a:rPr>
+              <a:t>MD5</a:t>
+            </a:r>
+            <a:endParaRPr lang="fa-IR" sz="2900" dirty="0">
               <a:latin typeface="Times New Roman" panose="02020503050405090304" pitchFamily="18" charset="0"/>
               <a:cs typeface="B Nazanin" panose="00000400000000000000" pitchFamily="2" charset="-78"/>
             </a:endParaRPr>
+          </a:p>
+          <a:p>
+            <a:pPr algn="r" rtl="1"/>
+            <a:r>
+              <a:rPr lang="fa-IR" sz="2900" dirty="0">
+                <a:latin typeface="Times New Roman" panose="02020503050405090304" pitchFamily="18" charset="0"/>
+                <a:cs typeface="B Nazanin" panose="00000400000000000000" pitchFamily="2" charset="-78"/>
+              </a:rPr>
+              <a:t>نمایش اطلاعات شخصی با استفاده از فیلتر </a:t>
+            </a:r>
+            <a:r>
+              <a:rPr lang="en-US" sz="2900" dirty="0">
+                <a:latin typeface="Times New Roman" panose="02020503050405090304" pitchFamily="18" charset="0"/>
+                <a:cs typeface="B Nazanin" panose="00000400000000000000" pitchFamily="2" charset="-78"/>
+              </a:rPr>
+              <a:t>ID</a:t>
+            </a:r>
+            <a:r>
+              <a:rPr lang="fa-IR" sz="2900" dirty="0">
+                <a:latin typeface="Times New Roman" panose="02020503050405090304" pitchFamily="18" charset="0"/>
+                <a:cs typeface="B Nazanin" panose="00000400000000000000" pitchFamily="2" charset="-78"/>
+              </a:rPr>
+              <a:t> فرد از پایگاه </a:t>
+            </a:r>
+            <a:r>
+              <a:rPr lang="fa-IR" sz="2900" dirty="0" smtClean="0">
+                <a:latin typeface="Times New Roman" panose="02020503050405090304" pitchFamily="18" charset="0"/>
+                <a:cs typeface="B Nazanin" panose="00000400000000000000" pitchFamily="2" charset="-78"/>
+              </a:rPr>
+              <a:t>داده</a:t>
+            </a:r>
+          </a:p>
+          <a:p>
+            <a:pPr algn="r" rtl="1"/>
+            <a:r>
+              <a:rPr lang="fa-IR" sz="2900" dirty="0" smtClean="0">
+                <a:latin typeface="Times New Roman" panose="02020503050405090304" pitchFamily="18" charset="0"/>
+                <a:cs typeface="B Nazanin" panose="00000400000000000000" pitchFamily="2" charset="-78"/>
+              </a:rPr>
+              <a:t>چک کردن معتبر بودن ایمیل در زمان ثبت‌نام از طریق جاوا اسکریپت </a:t>
+            </a:r>
+          </a:p>
+          <a:p>
+            <a:pPr algn="r" rtl="1"/>
+            <a:r>
+              <a:rPr lang="fa-IR" sz="2900" dirty="0" smtClean="0">
+                <a:latin typeface="Times New Roman" panose="02020503050405090304" pitchFamily="18" charset="0"/>
+                <a:cs typeface="B Nazanin" panose="00000400000000000000" pitchFamily="2" charset="-78"/>
+              </a:rPr>
+              <a:t>چک کردن معتبر بودن ایمیل از طریق ایجکس در سمت سرور</a:t>
+            </a:r>
+          </a:p>
+          <a:p>
+            <a:pPr algn="r" rtl="1"/>
+            <a:r>
+              <a:rPr lang="fa-IR" sz="2900" dirty="0" smtClean="0">
+                <a:latin typeface="Times New Roman" panose="02020503050405090304" pitchFamily="18" charset="0"/>
+                <a:cs typeface="B Nazanin" panose="00000400000000000000" pitchFamily="2" charset="-78"/>
+              </a:rPr>
+              <a:t>چک کردن تکراری نبودن ایمیل از طریق ایجکس در سمت سرور</a:t>
+            </a:r>
+          </a:p>
+          <a:p>
+            <a:pPr algn="r" rtl="1"/>
+            <a:r>
+              <a:rPr lang="fa-IR" sz="2900" dirty="0" smtClean="0">
+                <a:latin typeface="Times New Roman" panose="02020503050405090304" pitchFamily="18" charset="0"/>
+                <a:cs typeface="B Nazanin" panose="00000400000000000000" pitchFamily="2" charset="-78"/>
+              </a:rPr>
+              <a:t>محدودیت‌های نام و نام کاربری با استفاده از جاوا اسکریپت چک می‌شوند</a:t>
+            </a:r>
+            <a:endParaRPr lang="fa-IR" sz="2900" dirty="0" smtClean="0">
+              <a:latin typeface="Times New Roman" panose="02020503050405090304" pitchFamily="18" charset="0"/>
+              <a:cs typeface="B Nazanin" panose="00000400000000000000" pitchFamily="2" charset="-78"/>
+            </a:endParaRPr>
+          </a:p>
+          <a:p>
+            <a:pPr algn="r" rtl="1"/>
+            <a:r>
+              <a:rPr lang="fa-IR" sz="2900" dirty="0" smtClean="0">
+                <a:latin typeface="Times New Roman" panose="02020503050405090304" pitchFamily="18" charset="0"/>
+                <a:cs typeface="B Nazanin" panose="00000400000000000000" pitchFamily="2" charset="-78"/>
+              </a:rPr>
+              <a:t>استفاده از پروتکل امن برای دسترسی به سایت</a:t>
+            </a:r>
           </a:p>
         </p:txBody>
       </p:sp>
@@ -33739,6 +34013,112 @@
         <p:txBody>
           <a:bodyPr/>
           <a:lstStyle/>
+          <a:p>
+            <a:pPr algn="r" rtl="1"/>
+            <a:r>
+              <a:rPr lang="fa-IR" dirty="0" smtClean="0">
+                <a:latin typeface="Times New Roman" panose="02020503050405090304" pitchFamily="18" charset="0"/>
+                <a:cs typeface="B Nazanin" panose="00000400000000000000" pitchFamily="2" charset="-78"/>
+              </a:rPr>
+              <a:t>نقطه ایمیل</a:t>
+            </a:r>
+          </a:p>
+          <a:p>
+            <a:pPr algn="r" rtl="1"/>
+            <a:r>
+              <a:rPr lang="en-US" dirty="0" smtClean="0">
+                <a:latin typeface="Times New Roman" panose="02020503050405090304" pitchFamily="18" charset="0"/>
+                <a:cs typeface="B Nazanin" panose="00000400000000000000" pitchFamily="2" charset="-78"/>
+              </a:rPr>
+              <a:t>Tab</a:t>
+            </a:r>
+            <a:r>
+              <a:rPr lang="fa-IR" dirty="0" smtClean="0">
+                <a:latin typeface="Times New Roman" panose="02020503050405090304" pitchFamily="18" charset="0"/>
+                <a:cs typeface="B Nazanin" panose="00000400000000000000" pitchFamily="2" charset="-78"/>
+              </a:rPr>
+              <a:t> و تغییر ظاهر </a:t>
+            </a:r>
+            <a:r>
+              <a:rPr lang="en-US" dirty="0" smtClean="0">
+                <a:latin typeface="Times New Roman" panose="02020503050405090304" pitchFamily="18" charset="0"/>
+                <a:cs typeface="B Nazanin" panose="00000400000000000000" pitchFamily="2" charset="-78"/>
+              </a:rPr>
+              <a:t>Login</a:t>
+            </a:r>
+          </a:p>
+          <a:p>
+            <a:pPr algn="r" rtl="1"/>
+            <a:r>
+              <a:rPr lang="fa-IR" dirty="0" smtClean="0">
+                <a:latin typeface="Times New Roman" panose="02020503050405090304" pitchFamily="18" charset="0"/>
+                <a:cs typeface="B Nazanin" panose="00000400000000000000" pitchFamily="2" charset="-78"/>
+              </a:rPr>
+              <a:t>مشکل نمایش نتایج جستجوی افراد</a:t>
+            </a:r>
+          </a:p>
+          <a:p>
+            <a:pPr algn="r" rtl="1"/>
+            <a:r>
+              <a:rPr lang="en-US" dirty="0" smtClean="0">
+                <a:latin typeface="Times New Roman" panose="02020503050405090304" pitchFamily="18" charset="0"/>
+                <a:cs typeface="B Nazanin" panose="00000400000000000000" pitchFamily="2" charset="-78"/>
+              </a:rPr>
+              <a:t>Tab</a:t>
+            </a:r>
+            <a:r>
+              <a:rPr lang="fa-IR" dirty="0" smtClean="0">
+                <a:latin typeface="Times New Roman" panose="02020503050405090304" pitchFamily="18" charset="0"/>
+                <a:cs typeface="B Nazanin" panose="00000400000000000000" pitchFamily="2" charset="-78"/>
+              </a:rPr>
+              <a:t> و قرمز شدن بخش انتخاب شده در زمان ثبت‌نام</a:t>
+            </a:r>
+          </a:p>
+          <a:p>
+            <a:pPr algn="r" rtl="1"/>
+            <a:r>
+              <a:rPr lang="fa-IR" dirty="0" smtClean="0">
+                <a:latin typeface="Times New Roman" panose="02020503050405090304" pitchFamily="18" charset="0"/>
+                <a:cs typeface="B Nazanin" panose="00000400000000000000" pitchFamily="2" charset="-78"/>
+              </a:rPr>
+              <a:t>مشکل </a:t>
+            </a:r>
+            <a:r>
+              <a:rPr lang="en-US" dirty="0" smtClean="0">
+                <a:latin typeface="Times New Roman" panose="02020503050405090304" pitchFamily="18" charset="0"/>
+                <a:cs typeface="B Nazanin" panose="00000400000000000000" pitchFamily="2" charset="-78"/>
+              </a:rPr>
+              <a:t>space</a:t>
+            </a:r>
+            <a:r>
+              <a:rPr lang="fa-IR" dirty="0" smtClean="0">
+                <a:latin typeface="Times New Roman" panose="02020503050405090304" pitchFamily="18" charset="0"/>
+                <a:cs typeface="B Nazanin" panose="00000400000000000000" pitchFamily="2" charset="-78"/>
+              </a:rPr>
+              <a:t> در هنگام جستجو افراد</a:t>
+            </a:r>
+            <a:endParaRPr lang="fa-IR" dirty="0" smtClean="0">
+              <a:latin typeface="Times New Roman" panose="02020503050405090304" pitchFamily="18" charset="0"/>
+              <a:cs typeface="B Nazanin" panose="00000400000000000000" pitchFamily="2" charset="-78"/>
+            </a:endParaRPr>
+          </a:p>
+          <a:p>
+            <a:pPr algn="r" rtl="1"/>
+            <a:r>
+              <a:rPr lang="fa-IR" dirty="0" smtClean="0">
+                <a:latin typeface="Times New Roman" panose="02020503050405090304" pitchFamily="18" charset="0"/>
+                <a:cs typeface="B Nazanin" panose="00000400000000000000" pitchFamily="2" charset="-78"/>
+              </a:rPr>
+              <a:t>حساسیت به کوچک و بزرگ بودن حروف در هنگام جستجو</a:t>
+            </a:r>
+          </a:p>
+          <a:p>
+            <a:pPr algn="r" rtl="1"/>
+            <a:endParaRPr lang="fa-IR" dirty="0" smtClean="0">
+              <a:latin typeface="Times New Roman" panose="02020503050405090304" pitchFamily="18" charset="0"/>
+              <a:cs typeface="B Nazanin" panose="00000400000000000000" pitchFamily="2" charset="-78"/>
+            </a:endParaRPr>
+          </a:p>
           <a:p>
             <a:pPr algn="r" rtl="1"/>
             <a:endParaRPr lang="en-US" dirty="0">
@@ -35627,7 +36007,21 @@
                 <a:latin typeface="Times New Roman" panose="02020503050405090304" pitchFamily="18" charset="0"/>
                 <a:cs typeface="B Nazanin" panose="00000400000000000000" pitchFamily="2" charset="-78"/>
               </a:rPr>
-              <a:t>ایجاد صفحه خانگی سایت</a:t>
+              <a:t>طراحی و </a:t>
+            </a:r>
+            <a:r>
+              <a:rPr lang="fa-IR" dirty="0" smtClean="0">
+                <a:latin typeface="Times New Roman" panose="02020503050405090304" pitchFamily="18" charset="0"/>
+                <a:cs typeface="B Nazanin" panose="00000400000000000000" pitchFamily="2" charset="-78"/>
+              </a:rPr>
+              <a:t>ساخت </a:t>
+            </a:r>
+            <a:r>
+              <a:rPr lang="fa-IR" dirty="0" smtClean="0">
+                <a:latin typeface="Times New Roman" panose="02020503050405090304" pitchFamily="18" charset="0"/>
+                <a:cs typeface="B Nazanin" panose="00000400000000000000" pitchFamily="2" charset="-78"/>
+              </a:rPr>
+              <a:t>صفحه خانگی سایت</a:t>
             </a:r>
           </a:p>
           <a:p>
@@ -35657,7 +36051,7 @@
                 <a:latin typeface="Times New Roman" panose="02020503050405090304" pitchFamily="18" charset="0"/>
                 <a:cs typeface="B Nazanin" panose="00000400000000000000" pitchFamily="2" charset="-78"/>
               </a:rPr>
-              <a:t>ورود به سایت</a:t>
+              <a:t>ورود به و خروج از سایت</a:t>
             </a:r>
           </a:p>
           <a:p>
@@ -35667,8 +36061,81 @@
                 <a:latin typeface="Times New Roman" panose="02020503050405090304" pitchFamily="18" charset="0"/>
                 <a:cs typeface="B Nazanin" panose="00000400000000000000" pitchFamily="2" charset="-78"/>
               </a:rPr>
-              <a:t>بلا بلا بلا بعدان اضافه میشه</a:t>
+              <a:t>طراحی و ساخت صفحه نمایه –</a:t>
             </a:r>
+            <a:r>
+              <a:rPr lang="en-US" dirty="0" smtClean="0">
+                <a:latin typeface="Times New Roman" panose="02020503050405090304" pitchFamily="18" charset="0"/>
+                <a:cs typeface="B Nazanin" panose="00000400000000000000" pitchFamily="2" charset="-78"/>
+              </a:rPr>
+              <a:t>Psychograph</a:t>
+            </a:r>
+            <a:r>
+              <a:rPr lang="fa-IR" dirty="0" smtClean="0">
+                <a:latin typeface="Times New Roman" panose="02020503050405090304" pitchFamily="18" charset="0"/>
+                <a:cs typeface="B Nazanin" panose="00000400000000000000" pitchFamily="2" charset="-78"/>
+              </a:rPr>
+              <a:t>-</a:t>
+            </a:r>
+          </a:p>
+          <a:p>
+            <a:pPr algn="r" rtl="1"/>
+            <a:r>
+              <a:rPr lang="fa-IR" dirty="0" smtClean="0">
+                <a:latin typeface="Times New Roman" panose="02020503050405090304" pitchFamily="18" charset="0"/>
+                <a:cs typeface="B Nazanin" panose="00000400000000000000" pitchFamily="2" charset="-78"/>
+              </a:rPr>
+              <a:t>ویرایش بخشی از اطلاعات شخصی</a:t>
+            </a:r>
+          </a:p>
+          <a:p>
+            <a:pPr algn="r" rtl="1"/>
+            <a:r>
+              <a:rPr lang="fa-IR" dirty="0" smtClean="0">
+                <a:latin typeface="Times New Roman" panose="02020503050405090304" pitchFamily="18" charset="0"/>
+                <a:cs typeface="B Nazanin" panose="00000400000000000000" pitchFamily="2" charset="-78"/>
+              </a:rPr>
+              <a:t>قراردادن عکس پیشفرض نمایه با استفاده از </a:t>
+            </a:r>
+            <a:r>
+              <a:rPr lang="en-US" dirty="0" err="1" smtClean="0">
+                <a:latin typeface="Times New Roman" panose="02020503050405090304" pitchFamily="18" charset="0"/>
+                <a:cs typeface="B Nazanin" panose="00000400000000000000" pitchFamily="2" charset="-78"/>
+              </a:rPr>
+              <a:t>Gravatar</a:t>
+            </a:r>
+            <a:endParaRPr lang="fa-IR" dirty="0" smtClean="0">
+              <a:latin typeface="Times New Roman" panose="02020503050405090304" pitchFamily="18" charset="0"/>
+              <a:cs typeface="B Nazanin" panose="00000400000000000000" pitchFamily="2" charset="-78"/>
+            </a:endParaRPr>
+          </a:p>
+          <a:p>
+            <a:pPr algn="r" rtl="1"/>
+            <a:r>
+              <a:rPr lang="fa-IR" dirty="0" smtClean="0">
+                <a:latin typeface="Times New Roman" panose="02020503050405090304" pitchFamily="18" charset="0"/>
+                <a:cs typeface="B Nazanin" panose="00000400000000000000" pitchFamily="2" charset="-78"/>
+              </a:rPr>
+              <a:t>جستجو</a:t>
+            </a:r>
+            <a:r>
+              <a:rPr lang="fa-IR" dirty="0">
+                <a:latin typeface="Times New Roman" panose="02020503050405090304" pitchFamily="18" charset="0"/>
+                <a:cs typeface="B Nazanin" panose="00000400000000000000" pitchFamily="2" charset="-78"/>
+              </a:rPr>
+              <a:t>ی</a:t>
+            </a:r>
+            <a:r>
+              <a:rPr lang="fa-IR" dirty="0" smtClean="0">
+                <a:latin typeface="Times New Roman" panose="02020503050405090304" pitchFamily="18" charset="0"/>
+                <a:cs typeface="B Nazanin" panose="00000400000000000000" pitchFamily="2" charset="-78"/>
+              </a:rPr>
+              <a:t> افراد</a:t>
+            </a:r>
+            <a:endParaRPr lang="fa-IR" dirty="0" smtClean="0">
+              <a:latin typeface="Times New Roman" panose="02020503050405090304" pitchFamily="18" charset="0"/>
+              <a:cs typeface="B Nazanin" panose="00000400000000000000" pitchFamily="2" charset="-78"/>
+            </a:endParaRPr>
           </a:p>
           <a:p>
             <a:pPr algn="r" rtl="1"/>

</xml_diff>